<commit_message>
ppt y readme final
</commit_message>
<xml_diff>
--- a/MCPP_Trabajo_Final/Análisis de acuerdos de paz 2016.pptx
+++ b/MCPP_Trabajo_Final/Análisis de acuerdos de paz 2016.pptx
@@ -3606,7 +3606,7 @@
       </p:sp>
       <p:pic>
         <p:nvPicPr>
-          <p:cNvPr id="5" name="Imagen 4"/>
+          <p:cNvPr id="6" name="Imagen 5"/>
           <p:cNvPicPr>
             <a:picLocks noChangeAspect="1"/>
           </p:cNvPicPr>
@@ -3620,182 +3620,197 @@
         </p:blipFill>
         <p:spPr>
           <a:xfrm>
-            <a:off x="5894769" y="2259611"/>
-            <a:ext cx="6108545" cy="4242789"/>
+            <a:off x="146105" y="2259611"/>
+            <a:ext cx="5616066" cy="4242789"/>
           </a:xfrm>
           <a:prstGeom prst="rect">
             <a:avLst/>
           </a:prstGeom>
         </p:spPr>
       </p:pic>
-      <p:pic>
-        <p:nvPicPr>
-          <p:cNvPr id="6" name="Imagen 5"/>
-          <p:cNvPicPr>
-            <a:picLocks noChangeAspect="1"/>
-          </p:cNvPicPr>
+      <p:grpSp>
+        <p:nvGrpSpPr>
+          <p:cNvPr id="3" name="Grupo 2"/>
+          <p:cNvGrpSpPr/>
           <p:nvPr/>
-        </p:nvPicPr>
-        <p:blipFill>
-          <a:blip r:embed="rId3"/>
-          <a:stretch>
-            <a:fillRect/>
-          </a:stretch>
-        </p:blipFill>
-        <p:spPr>
-          <a:xfrm>
-            <a:off x="146105" y="2259611"/>
-            <a:ext cx="5616066" cy="4242789"/>
-          </a:xfrm>
-          <a:prstGeom prst="rect">
-            <a:avLst/>
-          </a:prstGeom>
-        </p:spPr>
-      </p:pic>
-      <p:cxnSp>
-        <p:nvCxnSpPr>
-          <p:cNvPr id="7" name="Conector recto de flecha 6"/>
-          <p:cNvCxnSpPr/>
-          <p:nvPr/>
-        </p:nvCxnSpPr>
-        <p:spPr>
-          <a:xfrm flipV="1">
-            <a:off x="6057073" y="3592488"/>
-            <a:ext cx="0" cy="595746"/>
-          </a:xfrm>
-          <a:prstGeom prst="straightConnector1">
-            <a:avLst/>
-          </a:prstGeom>
-          <a:ln w="25400">
-            <a:solidFill>
-              <a:srgbClr val="C00000"/>
-            </a:solidFill>
-            <a:tailEnd type="triangle"/>
-          </a:ln>
-        </p:spPr>
-        <p:style>
-          <a:lnRef idx="1">
-            <a:schemeClr val="accent1"/>
-          </a:lnRef>
-          <a:fillRef idx="0">
-            <a:schemeClr val="accent1"/>
-          </a:fillRef>
-          <a:effectRef idx="0">
-            <a:schemeClr val="accent1"/>
-          </a:effectRef>
-          <a:fontRef idx="minor">
-            <a:schemeClr val="tx1"/>
-          </a:fontRef>
-        </p:style>
-      </p:cxnSp>
-      <p:cxnSp>
-        <p:nvCxnSpPr>
-          <p:cNvPr id="22" name="Conector recto de flecha 21"/>
-          <p:cNvCxnSpPr/>
-          <p:nvPr/>
-        </p:nvCxnSpPr>
-        <p:spPr>
-          <a:xfrm flipV="1">
-            <a:off x="6733308" y="4894819"/>
-            <a:ext cx="2637" cy="245221"/>
-          </a:xfrm>
-          <a:prstGeom prst="straightConnector1">
-            <a:avLst/>
-          </a:prstGeom>
-          <a:ln w="25400">
-            <a:solidFill>
-              <a:srgbClr val="C00000"/>
-            </a:solidFill>
-            <a:tailEnd type="triangle"/>
-          </a:ln>
-        </p:spPr>
-        <p:style>
-          <a:lnRef idx="1">
-            <a:schemeClr val="accent1"/>
-          </a:lnRef>
-          <a:fillRef idx="0">
-            <a:schemeClr val="accent1"/>
-          </a:fillRef>
-          <a:effectRef idx="0">
-            <a:schemeClr val="accent1"/>
-          </a:effectRef>
-          <a:fontRef idx="minor">
-            <a:schemeClr val="tx1"/>
-          </a:fontRef>
-        </p:style>
-      </p:cxnSp>
-      <p:cxnSp>
-        <p:nvCxnSpPr>
-          <p:cNvPr id="23" name="Conector recto de flecha 22"/>
-          <p:cNvCxnSpPr/>
-          <p:nvPr/>
-        </p:nvCxnSpPr>
-        <p:spPr>
-          <a:xfrm flipH="1" flipV="1">
-            <a:off x="7370618" y="5017429"/>
-            <a:ext cx="16491" cy="175264"/>
-          </a:xfrm>
-          <a:prstGeom prst="straightConnector1">
-            <a:avLst/>
-          </a:prstGeom>
-          <a:ln w="25400">
-            <a:solidFill>
-              <a:srgbClr val="C00000"/>
-            </a:solidFill>
-            <a:tailEnd type="triangle"/>
-          </a:ln>
-        </p:spPr>
-        <p:style>
-          <a:lnRef idx="1">
-            <a:schemeClr val="accent1"/>
-          </a:lnRef>
-          <a:fillRef idx="0">
-            <a:schemeClr val="accent1"/>
-          </a:fillRef>
-          <a:effectRef idx="0">
-            <a:schemeClr val="accent1"/>
-          </a:effectRef>
-          <a:fontRef idx="minor">
-            <a:schemeClr val="tx1"/>
-          </a:fontRef>
-        </p:style>
-      </p:cxnSp>
-      <p:cxnSp>
-        <p:nvCxnSpPr>
-          <p:cNvPr id="26" name="Conector recto de flecha 25"/>
-          <p:cNvCxnSpPr/>
-          <p:nvPr/>
-        </p:nvCxnSpPr>
-        <p:spPr>
-          <a:xfrm flipH="1" flipV="1">
-            <a:off x="7966362" y="5003578"/>
-            <a:ext cx="16491" cy="175264"/>
-          </a:xfrm>
-          <a:prstGeom prst="straightConnector1">
-            <a:avLst/>
-          </a:prstGeom>
-          <a:ln w="25400">
-            <a:solidFill>
-              <a:srgbClr val="C00000"/>
-            </a:solidFill>
-            <a:tailEnd type="triangle"/>
-          </a:ln>
-        </p:spPr>
-        <p:style>
-          <a:lnRef idx="1">
-            <a:schemeClr val="accent1"/>
-          </a:lnRef>
-          <a:fillRef idx="0">
-            <a:schemeClr val="accent1"/>
-          </a:fillRef>
-          <a:effectRef idx="0">
-            <a:schemeClr val="accent1"/>
-          </a:effectRef>
-          <a:fontRef idx="minor">
-            <a:schemeClr val="tx1"/>
-          </a:fontRef>
-        </p:style>
-      </p:cxnSp>
+        </p:nvGrpSpPr>
+        <p:grpSpPr>
+          <a:xfrm>
+            <a:off x="5894769" y="2259611"/>
+            <a:ext cx="6108545" cy="4242789"/>
+            <a:chOff x="5894769" y="2259611"/>
+            <a:chExt cx="6108545" cy="4242789"/>
+          </a:xfrm>
+        </p:grpSpPr>
+        <p:pic>
+          <p:nvPicPr>
+            <p:cNvPr id="5" name="Imagen 4"/>
+            <p:cNvPicPr>
+              <a:picLocks noChangeAspect="1"/>
+            </p:cNvPicPr>
+            <p:nvPr/>
+          </p:nvPicPr>
+          <p:blipFill>
+            <a:blip r:embed="rId3"/>
+            <a:stretch>
+              <a:fillRect/>
+            </a:stretch>
+          </p:blipFill>
+          <p:spPr>
+            <a:xfrm>
+              <a:off x="5894769" y="2259611"/>
+              <a:ext cx="6108545" cy="4242789"/>
+            </a:xfrm>
+            <a:prstGeom prst="rect">
+              <a:avLst/>
+            </a:prstGeom>
+          </p:spPr>
+        </p:pic>
+        <p:cxnSp>
+          <p:nvCxnSpPr>
+            <p:cNvPr id="7" name="Conector recto de flecha 6"/>
+            <p:cNvCxnSpPr/>
+            <p:nvPr/>
+          </p:nvCxnSpPr>
+          <p:spPr>
+            <a:xfrm flipV="1">
+              <a:off x="6057073" y="3592488"/>
+              <a:ext cx="0" cy="595746"/>
+            </a:xfrm>
+            <a:prstGeom prst="straightConnector1">
+              <a:avLst/>
+            </a:prstGeom>
+            <a:ln w="25400">
+              <a:solidFill>
+                <a:srgbClr val="C00000"/>
+              </a:solidFill>
+              <a:tailEnd type="triangle"/>
+            </a:ln>
+          </p:spPr>
+          <p:style>
+            <a:lnRef idx="1">
+              <a:schemeClr val="accent1"/>
+            </a:lnRef>
+            <a:fillRef idx="0">
+              <a:schemeClr val="accent1"/>
+            </a:fillRef>
+            <a:effectRef idx="0">
+              <a:schemeClr val="accent1"/>
+            </a:effectRef>
+            <a:fontRef idx="minor">
+              <a:schemeClr val="tx1"/>
+            </a:fontRef>
+          </p:style>
+        </p:cxnSp>
+        <p:cxnSp>
+          <p:nvCxnSpPr>
+            <p:cNvPr id="22" name="Conector recto de flecha 21"/>
+            <p:cNvCxnSpPr/>
+            <p:nvPr/>
+          </p:nvCxnSpPr>
+          <p:spPr>
+            <a:xfrm flipV="1">
+              <a:off x="6733308" y="4894819"/>
+              <a:ext cx="2637" cy="245221"/>
+            </a:xfrm>
+            <a:prstGeom prst="straightConnector1">
+              <a:avLst/>
+            </a:prstGeom>
+            <a:ln w="25400">
+              <a:solidFill>
+                <a:srgbClr val="C00000"/>
+              </a:solidFill>
+              <a:tailEnd type="triangle"/>
+            </a:ln>
+          </p:spPr>
+          <p:style>
+            <a:lnRef idx="1">
+              <a:schemeClr val="accent1"/>
+            </a:lnRef>
+            <a:fillRef idx="0">
+              <a:schemeClr val="accent1"/>
+            </a:fillRef>
+            <a:effectRef idx="0">
+              <a:schemeClr val="accent1"/>
+            </a:effectRef>
+            <a:fontRef idx="minor">
+              <a:schemeClr val="tx1"/>
+            </a:fontRef>
+          </p:style>
+        </p:cxnSp>
+        <p:cxnSp>
+          <p:nvCxnSpPr>
+            <p:cNvPr id="23" name="Conector recto de flecha 22"/>
+            <p:cNvCxnSpPr/>
+            <p:nvPr/>
+          </p:nvCxnSpPr>
+          <p:spPr>
+            <a:xfrm flipH="1" flipV="1">
+              <a:off x="7370618" y="5017429"/>
+              <a:ext cx="16491" cy="175264"/>
+            </a:xfrm>
+            <a:prstGeom prst="straightConnector1">
+              <a:avLst/>
+            </a:prstGeom>
+            <a:ln w="25400">
+              <a:solidFill>
+                <a:srgbClr val="C00000"/>
+              </a:solidFill>
+              <a:tailEnd type="triangle"/>
+            </a:ln>
+          </p:spPr>
+          <p:style>
+            <a:lnRef idx="1">
+              <a:schemeClr val="accent1"/>
+            </a:lnRef>
+            <a:fillRef idx="0">
+              <a:schemeClr val="accent1"/>
+            </a:fillRef>
+            <a:effectRef idx="0">
+              <a:schemeClr val="accent1"/>
+            </a:effectRef>
+            <a:fontRef idx="minor">
+              <a:schemeClr val="tx1"/>
+            </a:fontRef>
+          </p:style>
+        </p:cxnSp>
+        <p:cxnSp>
+          <p:nvCxnSpPr>
+            <p:cNvPr id="26" name="Conector recto de flecha 25"/>
+            <p:cNvCxnSpPr/>
+            <p:nvPr/>
+          </p:nvCxnSpPr>
+          <p:spPr>
+            <a:xfrm flipH="1" flipV="1">
+              <a:off x="7966362" y="5003578"/>
+              <a:ext cx="16491" cy="175264"/>
+            </a:xfrm>
+            <a:prstGeom prst="straightConnector1">
+              <a:avLst/>
+            </a:prstGeom>
+            <a:ln w="25400">
+              <a:solidFill>
+                <a:srgbClr val="C00000"/>
+              </a:solidFill>
+              <a:tailEnd type="triangle"/>
+            </a:ln>
+          </p:spPr>
+          <p:style>
+            <a:lnRef idx="1">
+              <a:schemeClr val="accent1"/>
+            </a:lnRef>
+            <a:fillRef idx="0">
+              <a:schemeClr val="accent1"/>
+            </a:fillRef>
+            <a:effectRef idx="0">
+              <a:schemeClr val="accent1"/>
+            </a:effectRef>
+            <a:fontRef idx="minor">
+              <a:schemeClr val="tx1"/>
+            </a:fontRef>
+          </p:style>
+        </p:cxnSp>
+      </p:grpSp>
     </p:spTree>
     <p:extLst>
       <p:ext uri="{BB962C8B-B14F-4D97-AF65-F5344CB8AC3E}">
@@ -4258,210 +4273,225 @@
           </a:prstGeom>
         </p:spPr>
       </p:pic>
-      <p:pic>
-        <p:nvPicPr>
-          <p:cNvPr id="4" name="Imagen 3"/>
-          <p:cNvPicPr>
-            <a:picLocks noChangeAspect="1"/>
-          </p:cNvPicPr>
+      <p:grpSp>
+        <p:nvGrpSpPr>
+          <p:cNvPr id="5" name="Grupo 4"/>
+          <p:cNvGrpSpPr/>
           <p:nvPr/>
-        </p:nvPicPr>
-        <p:blipFill>
-          <a:blip r:embed="rId3"/>
-          <a:stretch>
-            <a:fillRect/>
-          </a:stretch>
-        </p:blipFill>
-        <p:spPr>
+        </p:nvGrpSpPr>
+        <p:grpSpPr>
           <a:xfrm>
             <a:off x="5879808" y="2255289"/>
             <a:ext cx="6062810" cy="4247111"/>
-          </a:xfrm>
-          <a:prstGeom prst="rect">
-            <a:avLst/>
-          </a:prstGeom>
-        </p:spPr>
-      </p:pic>
-      <p:cxnSp>
-        <p:nvCxnSpPr>
-          <p:cNvPr id="7" name="Conector recto de flecha 6"/>
-          <p:cNvCxnSpPr/>
-          <p:nvPr/>
-        </p:nvCxnSpPr>
-        <p:spPr>
-          <a:xfrm flipV="1">
-            <a:off x="6040580" y="3445343"/>
-            <a:ext cx="0" cy="595746"/>
-          </a:xfrm>
-          <a:prstGeom prst="straightConnector1">
-            <a:avLst/>
-          </a:prstGeom>
-          <a:ln w="25400">
-            <a:solidFill>
-              <a:srgbClr val="C00000"/>
-            </a:solidFill>
-            <a:tailEnd type="triangle"/>
-          </a:ln>
-        </p:spPr>
-        <p:style>
-          <a:lnRef idx="1">
-            <a:schemeClr val="accent1"/>
-          </a:lnRef>
-          <a:fillRef idx="0">
-            <a:schemeClr val="accent1"/>
-          </a:fillRef>
-          <a:effectRef idx="0">
-            <a:schemeClr val="accent1"/>
-          </a:effectRef>
-          <a:fontRef idx="minor">
-            <a:schemeClr val="tx1"/>
-          </a:fontRef>
-        </p:style>
-      </p:cxnSp>
-      <p:cxnSp>
-        <p:nvCxnSpPr>
-          <p:cNvPr id="16" name="Conector recto de flecha 15"/>
-          <p:cNvCxnSpPr/>
-          <p:nvPr/>
-        </p:nvCxnSpPr>
-        <p:spPr>
-          <a:xfrm flipV="1">
-            <a:off x="6788725" y="4304325"/>
-            <a:ext cx="0" cy="595746"/>
-          </a:xfrm>
-          <a:prstGeom prst="straightConnector1">
-            <a:avLst/>
-          </a:prstGeom>
-          <a:ln w="25400">
-            <a:solidFill>
-              <a:srgbClr val="C00000"/>
-            </a:solidFill>
-            <a:tailEnd type="triangle"/>
-          </a:ln>
-        </p:spPr>
-        <p:style>
-          <a:lnRef idx="1">
-            <a:schemeClr val="accent1"/>
-          </a:lnRef>
-          <a:fillRef idx="0">
-            <a:schemeClr val="accent1"/>
-          </a:fillRef>
-          <a:effectRef idx="0">
-            <a:schemeClr val="accent1"/>
-          </a:effectRef>
-          <a:fontRef idx="minor">
-            <a:schemeClr val="tx1"/>
-          </a:fontRef>
-        </p:style>
-      </p:cxnSp>
-      <p:cxnSp>
-        <p:nvCxnSpPr>
-          <p:cNvPr id="18" name="Conector recto de flecha 17"/>
-          <p:cNvCxnSpPr/>
-          <p:nvPr/>
-        </p:nvCxnSpPr>
-        <p:spPr>
-          <a:xfrm flipH="1" flipV="1">
-            <a:off x="7495308" y="5066325"/>
-            <a:ext cx="1" cy="295384"/>
-          </a:xfrm>
-          <a:prstGeom prst="straightConnector1">
-            <a:avLst/>
-          </a:prstGeom>
-          <a:ln w="25400">
-            <a:solidFill>
-              <a:srgbClr val="C00000"/>
-            </a:solidFill>
-            <a:tailEnd type="triangle"/>
-          </a:ln>
-        </p:spPr>
-        <p:style>
-          <a:lnRef idx="1">
-            <a:schemeClr val="accent1"/>
-          </a:lnRef>
-          <a:fillRef idx="0">
-            <a:schemeClr val="accent1"/>
-          </a:fillRef>
-          <a:effectRef idx="0">
-            <a:schemeClr val="accent1"/>
-          </a:effectRef>
-          <a:fontRef idx="minor">
-            <a:schemeClr val="tx1"/>
-          </a:fontRef>
-        </p:style>
-      </p:cxnSp>
-      <p:cxnSp>
-        <p:nvCxnSpPr>
-          <p:cNvPr id="19" name="Conector recto de flecha 18"/>
-          <p:cNvCxnSpPr/>
-          <p:nvPr/>
-        </p:nvCxnSpPr>
-        <p:spPr>
-          <a:xfrm flipV="1">
-            <a:off x="8922325" y="5066325"/>
-            <a:ext cx="13856" cy="297873"/>
-          </a:xfrm>
-          <a:prstGeom prst="straightConnector1">
-            <a:avLst/>
-          </a:prstGeom>
-          <a:ln w="25400">
-            <a:solidFill>
-              <a:srgbClr val="C00000"/>
-            </a:solidFill>
-            <a:tailEnd type="triangle"/>
-          </a:ln>
-        </p:spPr>
-        <p:style>
-          <a:lnRef idx="1">
-            <a:schemeClr val="accent1"/>
-          </a:lnRef>
-          <a:fillRef idx="0">
-            <a:schemeClr val="accent1"/>
-          </a:fillRef>
-          <a:effectRef idx="0">
-            <a:schemeClr val="accent1"/>
-          </a:effectRef>
-          <a:fontRef idx="minor">
-            <a:schemeClr val="tx1"/>
-          </a:fontRef>
-        </p:style>
-      </p:cxnSp>
-      <p:cxnSp>
-        <p:nvCxnSpPr>
-          <p:cNvPr id="24" name="Conector recto de flecha 23"/>
-          <p:cNvCxnSpPr/>
-          <p:nvPr/>
-        </p:nvCxnSpPr>
-        <p:spPr>
-          <a:xfrm flipV="1">
-            <a:off x="11083634" y="5066325"/>
-            <a:ext cx="13856" cy="297873"/>
-          </a:xfrm>
-          <a:prstGeom prst="straightConnector1">
-            <a:avLst/>
-          </a:prstGeom>
-          <a:ln w="25400">
-            <a:solidFill>
-              <a:srgbClr val="C00000"/>
-            </a:solidFill>
-            <a:tailEnd type="triangle"/>
-          </a:ln>
-        </p:spPr>
-        <p:style>
-          <a:lnRef idx="1">
-            <a:schemeClr val="accent1"/>
-          </a:lnRef>
-          <a:fillRef idx="0">
-            <a:schemeClr val="accent1"/>
-          </a:fillRef>
-          <a:effectRef idx="0">
-            <a:schemeClr val="accent1"/>
-          </a:effectRef>
-          <a:fontRef idx="minor">
-            <a:schemeClr val="tx1"/>
-          </a:fontRef>
-        </p:style>
-      </p:cxnSp>
+            <a:chOff x="5879808" y="2255289"/>
+            <a:chExt cx="6062810" cy="4247111"/>
+          </a:xfrm>
+        </p:grpSpPr>
+        <p:pic>
+          <p:nvPicPr>
+            <p:cNvPr id="4" name="Imagen 3"/>
+            <p:cNvPicPr>
+              <a:picLocks noChangeAspect="1"/>
+            </p:cNvPicPr>
+            <p:nvPr/>
+          </p:nvPicPr>
+          <p:blipFill>
+            <a:blip r:embed="rId3"/>
+            <a:stretch>
+              <a:fillRect/>
+            </a:stretch>
+          </p:blipFill>
+          <p:spPr>
+            <a:xfrm>
+              <a:off x="5879808" y="2255289"/>
+              <a:ext cx="6062810" cy="4247111"/>
+            </a:xfrm>
+            <a:prstGeom prst="rect">
+              <a:avLst/>
+            </a:prstGeom>
+          </p:spPr>
+        </p:pic>
+        <p:cxnSp>
+          <p:nvCxnSpPr>
+            <p:cNvPr id="7" name="Conector recto de flecha 6"/>
+            <p:cNvCxnSpPr/>
+            <p:nvPr/>
+          </p:nvCxnSpPr>
+          <p:spPr>
+            <a:xfrm flipV="1">
+              <a:off x="6040580" y="3445343"/>
+              <a:ext cx="0" cy="595746"/>
+            </a:xfrm>
+            <a:prstGeom prst="straightConnector1">
+              <a:avLst/>
+            </a:prstGeom>
+            <a:ln w="25400">
+              <a:solidFill>
+                <a:srgbClr val="C00000"/>
+              </a:solidFill>
+              <a:tailEnd type="triangle"/>
+            </a:ln>
+          </p:spPr>
+          <p:style>
+            <a:lnRef idx="1">
+              <a:schemeClr val="accent1"/>
+            </a:lnRef>
+            <a:fillRef idx="0">
+              <a:schemeClr val="accent1"/>
+            </a:fillRef>
+            <a:effectRef idx="0">
+              <a:schemeClr val="accent1"/>
+            </a:effectRef>
+            <a:fontRef idx="minor">
+              <a:schemeClr val="tx1"/>
+            </a:fontRef>
+          </p:style>
+        </p:cxnSp>
+        <p:cxnSp>
+          <p:nvCxnSpPr>
+            <p:cNvPr id="16" name="Conector recto de flecha 15"/>
+            <p:cNvCxnSpPr/>
+            <p:nvPr/>
+          </p:nvCxnSpPr>
+          <p:spPr>
+            <a:xfrm flipV="1">
+              <a:off x="6788725" y="4304325"/>
+              <a:ext cx="0" cy="595746"/>
+            </a:xfrm>
+            <a:prstGeom prst="straightConnector1">
+              <a:avLst/>
+            </a:prstGeom>
+            <a:ln w="25400">
+              <a:solidFill>
+                <a:srgbClr val="C00000"/>
+              </a:solidFill>
+              <a:tailEnd type="triangle"/>
+            </a:ln>
+          </p:spPr>
+          <p:style>
+            <a:lnRef idx="1">
+              <a:schemeClr val="accent1"/>
+            </a:lnRef>
+            <a:fillRef idx="0">
+              <a:schemeClr val="accent1"/>
+            </a:fillRef>
+            <a:effectRef idx="0">
+              <a:schemeClr val="accent1"/>
+            </a:effectRef>
+            <a:fontRef idx="minor">
+              <a:schemeClr val="tx1"/>
+            </a:fontRef>
+          </p:style>
+        </p:cxnSp>
+        <p:cxnSp>
+          <p:nvCxnSpPr>
+            <p:cNvPr id="18" name="Conector recto de flecha 17"/>
+            <p:cNvCxnSpPr/>
+            <p:nvPr/>
+          </p:nvCxnSpPr>
+          <p:spPr>
+            <a:xfrm flipH="1" flipV="1">
+              <a:off x="7495308" y="5066325"/>
+              <a:ext cx="1" cy="295384"/>
+            </a:xfrm>
+            <a:prstGeom prst="straightConnector1">
+              <a:avLst/>
+            </a:prstGeom>
+            <a:ln w="25400">
+              <a:solidFill>
+                <a:srgbClr val="C00000"/>
+              </a:solidFill>
+              <a:tailEnd type="triangle"/>
+            </a:ln>
+          </p:spPr>
+          <p:style>
+            <a:lnRef idx="1">
+              <a:schemeClr val="accent1"/>
+            </a:lnRef>
+            <a:fillRef idx="0">
+              <a:schemeClr val="accent1"/>
+            </a:fillRef>
+            <a:effectRef idx="0">
+              <a:schemeClr val="accent1"/>
+            </a:effectRef>
+            <a:fontRef idx="minor">
+              <a:schemeClr val="tx1"/>
+            </a:fontRef>
+          </p:style>
+        </p:cxnSp>
+        <p:cxnSp>
+          <p:nvCxnSpPr>
+            <p:cNvPr id="19" name="Conector recto de flecha 18"/>
+            <p:cNvCxnSpPr/>
+            <p:nvPr/>
+          </p:nvCxnSpPr>
+          <p:spPr>
+            <a:xfrm flipV="1">
+              <a:off x="8922325" y="5066325"/>
+              <a:ext cx="13856" cy="297873"/>
+            </a:xfrm>
+            <a:prstGeom prst="straightConnector1">
+              <a:avLst/>
+            </a:prstGeom>
+            <a:ln w="25400">
+              <a:solidFill>
+                <a:srgbClr val="C00000"/>
+              </a:solidFill>
+              <a:tailEnd type="triangle"/>
+            </a:ln>
+          </p:spPr>
+          <p:style>
+            <a:lnRef idx="1">
+              <a:schemeClr val="accent1"/>
+            </a:lnRef>
+            <a:fillRef idx="0">
+              <a:schemeClr val="accent1"/>
+            </a:fillRef>
+            <a:effectRef idx="0">
+              <a:schemeClr val="accent1"/>
+            </a:effectRef>
+            <a:fontRef idx="minor">
+              <a:schemeClr val="tx1"/>
+            </a:fontRef>
+          </p:style>
+        </p:cxnSp>
+        <p:cxnSp>
+          <p:nvCxnSpPr>
+            <p:cNvPr id="24" name="Conector recto de flecha 23"/>
+            <p:cNvCxnSpPr/>
+            <p:nvPr/>
+          </p:nvCxnSpPr>
+          <p:spPr>
+            <a:xfrm flipV="1">
+              <a:off x="11083634" y="5066325"/>
+              <a:ext cx="13856" cy="297873"/>
+            </a:xfrm>
+            <a:prstGeom prst="straightConnector1">
+              <a:avLst/>
+            </a:prstGeom>
+            <a:ln w="25400">
+              <a:solidFill>
+                <a:srgbClr val="C00000"/>
+              </a:solidFill>
+              <a:tailEnd type="triangle"/>
+            </a:ln>
+          </p:spPr>
+          <p:style>
+            <a:lnRef idx="1">
+              <a:schemeClr val="accent1"/>
+            </a:lnRef>
+            <a:fillRef idx="0">
+              <a:schemeClr val="accent1"/>
+            </a:fillRef>
+            <a:effectRef idx="0">
+              <a:schemeClr val="accent1"/>
+            </a:effectRef>
+            <a:fontRef idx="minor">
+              <a:schemeClr val="tx1"/>
+            </a:fontRef>
+          </p:style>
+        </p:cxnSp>
+      </p:grpSp>
     </p:spTree>
     <p:extLst>
       <p:ext uri="{BB962C8B-B14F-4D97-AF65-F5344CB8AC3E}">
@@ -4958,210 +4988,225 @@
           </a:prstGeom>
         </p:spPr>
       </p:pic>
-      <p:pic>
-        <p:nvPicPr>
-          <p:cNvPr id="6" name="Imagen 5"/>
-          <p:cNvPicPr>
-            <a:picLocks noChangeAspect="1"/>
-          </p:cNvPicPr>
+      <p:grpSp>
+        <p:nvGrpSpPr>
+          <p:cNvPr id="3" name="Grupo 2"/>
+          <p:cNvGrpSpPr/>
           <p:nvPr/>
-        </p:nvPicPr>
-        <p:blipFill>
-          <a:blip r:embed="rId3"/>
-          <a:stretch>
-            <a:fillRect/>
-          </a:stretch>
-        </p:blipFill>
-        <p:spPr>
+        </p:nvGrpSpPr>
+        <p:grpSpPr>
           <a:xfrm>
             <a:off x="5865294" y="2310694"/>
             <a:ext cx="6108992" cy="4191706"/>
-          </a:xfrm>
-          <a:prstGeom prst="rect">
-            <a:avLst/>
-          </a:prstGeom>
-        </p:spPr>
-      </p:pic>
-      <p:cxnSp>
-        <p:nvCxnSpPr>
-          <p:cNvPr id="7" name="Conector recto de flecha 6"/>
-          <p:cNvCxnSpPr/>
-          <p:nvPr/>
-        </p:nvCxnSpPr>
-        <p:spPr>
-          <a:xfrm flipV="1">
-            <a:off x="6026727" y="3521543"/>
-            <a:ext cx="4617" cy="260748"/>
-          </a:xfrm>
-          <a:prstGeom prst="straightConnector1">
-            <a:avLst/>
-          </a:prstGeom>
-          <a:ln w="25400">
-            <a:solidFill>
-              <a:srgbClr val="C00000"/>
-            </a:solidFill>
-            <a:tailEnd type="triangle"/>
-          </a:ln>
-        </p:spPr>
-        <p:style>
-          <a:lnRef idx="1">
-            <a:schemeClr val="accent1"/>
-          </a:lnRef>
-          <a:fillRef idx="0">
-            <a:schemeClr val="accent1"/>
-          </a:fillRef>
-          <a:effectRef idx="0">
-            <a:schemeClr val="accent1"/>
-          </a:effectRef>
-          <a:fontRef idx="minor">
-            <a:schemeClr val="tx1"/>
-          </a:fontRef>
-        </p:style>
-      </p:cxnSp>
-      <p:cxnSp>
-        <p:nvCxnSpPr>
-          <p:cNvPr id="17" name="Conector recto de flecha 16"/>
-          <p:cNvCxnSpPr/>
-          <p:nvPr/>
-        </p:nvCxnSpPr>
-        <p:spPr>
-          <a:xfrm flipV="1">
-            <a:off x="6664036" y="4962415"/>
-            <a:ext cx="4617" cy="260748"/>
-          </a:xfrm>
-          <a:prstGeom prst="straightConnector1">
-            <a:avLst/>
-          </a:prstGeom>
-          <a:ln w="25400">
-            <a:solidFill>
-              <a:srgbClr val="C00000"/>
-            </a:solidFill>
-            <a:tailEnd type="triangle"/>
-          </a:ln>
-        </p:spPr>
-        <p:style>
-          <a:lnRef idx="1">
-            <a:schemeClr val="accent1"/>
-          </a:lnRef>
-          <a:fillRef idx="0">
-            <a:schemeClr val="accent1"/>
-          </a:fillRef>
-          <a:effectRef idx="0">
-            <a:schemeClr val="accent1"/>
-          </a:effectRef>
-          <a:fontRef idx="minor">
-            <a:schemeClr val="tx1"/>
-          </a:fontRef>
-        </p:style>
-      </p:cxnSp>
-      <p:cxnSp>
-        <p:nvCxnSpPr>
-          <p:cNvPr id="20" name="Conector recto de flecha 19"/>
-          <p:cNvCxnSpPr/>
-          <p:nvPr/>
-        </p:nvCxnSpPr>
-        <p:spPr>
-          <a:xfrm flipV="1">
-            <a:off x="7315200" y="4962415"/>
-            <a:ext cx="4617" cy="260748"/>
-          </a:xfrm>
-          <a:prstGeom prst="straightConnector1">
-            <a:avLst/>
-          </a:prstGeom>
-          <a:ln w="25400">
-            <a:solidFill>
-              <a:srgbClr val="C00000"/>
-            </a:solidFill>
-            <a:tailEnd type="triangle"/>
-          </a:ln>
-        </p:spPr>
-        <p:style>
-          <a:lnRef idx="1">
-            <a:schemeClr val="accent1"/>
-          </a:lnRef>
-          <a:fillRef idx="0">
-            <a:schemeClr val="accent1"/>
-          </a:fillRef>
-          <a:effectRef idx="0">
-            <a:schemeClr val="accent1"/>
-          </a:effectRef>
-          <a:fontRef idx="minor">
-            <a:schemeClr val="tx1"/>
-          </a:fontRef>
-        </p:style>
-      </p:cxnSp>
-      <p:cxnSp>
-        <p:nvCxnSpPr>
-          <p:cNvPr id="21" name="Conector recto de flecha 20"/>
-          <p:cNvCxnSpPr/>
-          <p:nvPr/>
-        </p:nvCxnSpPr>
-        <p:spPr>
-          <a:xfrm flipV="1">
-            <a:off x="7951852" y="4962415"/>
-            <a:ext cx="4617" cy="260748"/>
-          </a:xfrm>
-          <a:prstGeom prst="straightConnector1">
-            <a:avLst/>
-          </a:prstGeom>
-          <a:ln w="25400">
-            <a:solidFill>
-              <a:srgbClr val="C00000"/>
-            </a:solidFill>
-            <a:tailEnd type="triangle"/>
-          </a:ln>
-        </p:spPr>
-        <p:style>
-          <a:lnRef idx="1">
-            <a:schemeClr val="accent1"/>
-          </a:lnRef>
-          <a:fillRef idx="0">
-            <a:schemeClr val="accent1"/>
-          </a:fillRef>
-          <a:effectRef idx="0">
-            <a:schemeClr val="accent1"/>
-          </a:effectRef>
-          <a:fontRef idx="minor">
-            <a:schemeClr val="tx1"/>
-          </a:fontRef>
-        </p:style>
-      </p:cxnSp>
-      <p:cxnSp>
-        <p:nvCxnSpPr>
-          <p:cNvPr id="22" name="Conector recto de flecha 21"/>
-          <p:cNvCxnSpPr/>
-          <p:nvPr/>
-        </p:nvCxnSpPr>
-        <p:spPr>
-          <a:xfrm flipV="1">
-            <a:off x="8601156" y="5078934"/>
-            <a:ext cx="4617" cy="260748"/>
-          </a:xfrm>
-          <a:prstGeom prst="straightConnector1">
-            <a:avLst/>
-          </a:prstGeom>
-          <a:ln w="25400">
-            <a:solidFill>
-              <a:srgbClr val="C00000"/>
-            </a:solidFill>
-            <a:tailEnd type="triangle"/>
-          </a:ln>
-        </p:spPr>
-        <p:style>
-          <a:lnRef idx="1">
-            <a:schemeClr val="accent1"/>
-          </a:lnRef>
-          <a:fillRef idx="0">
-            <a:schemeClr val="accent1"/>
-          </a:fillRef>
-          <a:effectRef idx="0">
-            <a:schemeClr val="accent1"/>
-          </a:effectRef>
-          <a:fontRef idx="minor">
-            <a:schemeClr val="tx1"/>
-          </a:fontRef>
-        </p:style>
-      </p:cxnSp>
+            <a:chOff x="5865294" y="2310694"/>
+            <a:chExt cx="6108992" cy="4191706"/>
+          </a:xfrm>
+        </p:grpSpPr>
+        <p:pic>
+          <p:nvPicPr>
+            <p:cNvPr id="6" name="Imagen 5"/>
+            <p:cNvPicPr>
+              <a:picLocks noChangeAspect="1"/>
+            </p:cNvPicPr>
+            <p:nvPr/>
+          </p:nvPicPr>
+          <p:blipFill>
+            <a:blip r:embed="rId3"/>
+            <a:stretch>
+              <a:fillRect/>
+            </a:stretch>
+          </p:blipFill>
+          <p:spPr>
+            <a:xfrm>
+              <a:off x="5865294" y="2310694"/>
+              <a:ext cx="6108992" cy="4191706"/>
+            </a:xfrm>
+            <a:prstGeom prst="rect">
+              <a:avLst/>
+            </a:prstGeom>
+          </p:spPr>
+        </p:pic>
+        <p:cxnSp>
+          <p:nvCxnSpPr>
+            <p:cNvPr id="7" name="Conector recto de flecha 6"/>
+            <p:cNvCxnSpPr/>
+            <p:nvPr/>
+          </p:nvCxnSpPr>
+          <p:spPr>
+            <a:xfrm flipV="1">
+              <a:off x="6026727" y="3521543"/>
+              <a:ext cx="4617" cy="260748"/>
+            </a:xfrm>
+            <a:prstGeom prst="straightConnector1">
+              <a:avLst/>
+            </a:prstGeom>
+            <a:ln w="25400">
+              <a:solidFill>
+                <a:srgbClr val="C00000"/>
+              </a:solidFill>
+              <a:tailEnd type="triangle"/>
+            </a:ln>
+          </p:spPr>
+          <p:style>
+            <a:lnRef idx="1">
+              <a:schemeClr val="accent1"/>
+            </a:lnRef>
+            <a:fillRef idx="0">
+              <a:schemeClr val="accent1"/>
+            </a:fillRef>
+            <a:effectRef idx="0">
+              <a:schemeClr val="accent1"/>
+            </a:effectRef>
+            <a:fontRef idx="minor">
+              <a:schemeClr val="tx1"/>
+            </a:fontRef>
+          </p:style>
+        </p:cxnSp>
+        <p:cxnSp>
+          <p:nvCxnSpPr>
+            <p:cNvPr id="17" name="Conector recto de flecha 16"/>
+            <p:cNvCxnSpPr/>
+            <p:nvPr/>
+          </p:nvCxnSpPr>
+          <p:spPr>
+            <a:xfrm flipV="1">
+              <a:off x="6664036" y="4962415"/>
+              <a:ext cx="4617" cy="260748"/>
+            </a:xfrm>
+            <a:prstGeom prst="straightConnector1">
+              <a:avLst/>
+            </a:prstGeom>
+            <a:ln w="25400">
+              <a:solidFill>
+                <a:srgbClr val="C00000"/>
+              </a:solidFill>
+              <a:tailEnd type="triangle"/>
+            </a:ln>
+          </p:spPr>
+          <p:style>
+            <a:lnRef idx="1">
+              <a:schemeClr val="accent1"/>
+            </a:lnRef>
+            <a:fillRef idx="0">
+              <a:schemeClr val="accent1"/>
+            </a:fillRef>
+            <a:effectRef idx="0">
+              <a:schemeClr val="accent1"/>
+            </a:effectRef>
+            <a:fontRef idx="minor">
+              <a:schemeClr val="tx1"/>
+            </a:fontRef>
+          </p:style>
+        </p:cxnSp>
+        <p:cxnSp>
+          <p:nvCxnSpPr>
+            <p:cNvPr id="20" name="Conector recto de flecha 19"/>
+            <p:cNvCxnSpPr/>
+            <p:nvPr/>
+          </p:nvCxnSpPr>
+          <p:spPr>
+            <a:xfrm flipV="1">
+              <a:off x="7315200" y="4962415"/>
+              <a:ext cx="4617" cy="260748"/>
+            </a:xfrm>
+            <a:prstGeom prst="straightConnector1">
+              <a:avLst/>
+            </a:prstGeom>
+            <a:ln w="25400">
+              <a:solidFill>
+                <a:srgbClr val="C00000"/>
+              </a:solidFill>
+              <a:tailEnd type="triangle"/>
+            </a:ln>
+          </p:spPr>
+          <p:style>
+            <a:lnRef idx="1">
+              <a:schemeClr val="accent1"/>
+            </a:lnRef>
+            <a:fillRef idx="0">
+              <a:schemeClr val="accent1"/>
+            </a:fillRef>
+            <a:effectRef idx="0">
+              <a:schemeClr val="accent1"/>
+            </a:effectRef>
+            <a:fontRef idx="minor">
+              <a:schemeClr val="tx1"/>
+            </a:fontRef>
+          </p:style>
+        </p:cxnSp>
+        <p:cxnSp>
+          <p:nvCxnSpPr>
+            <p:cNvPr id="21" name="Conector recto de flecha 20"/>
+            <p:cNvCxnSpPr/>
+            <p:nvPr/>
+          </p:nvCxnSpPr>
+          <p:spPr>
+            <a:xfrm flipV="1">
+              <a:off x="7951852" y="4962415"/>
+              <a:ext cx="4617" cy="260748"/>
+            </a:xfrm>
+            <a:prstGeom prst="straightConnector1">
+              <a:avLst/>
+            </a:prstGeom>
+            <a:ln w="25400">
+              <a:solidFill>
+                <a:srgbClr val="C00000"/>
+              </a:solidFill>
+              <a:tailEnd type="triangle"/>
+            </a:ln>
+          </p:spPr>
+          <p:style>
+            <a:lnRef idx="1">
+              <a:schemeClr val="accent1"/>
+            </a:lnRef>
+            <a:fillRef idx="0">
+              <a:schemeClr val="accent1"/>
+            </a:fillRef>
+            <a:effectRef idx="0">
+              <a:schemeClr val="accent1"/>
+            </a:effectRef>
+            <a:fontRef idx="minor">
+              <a:schemeClr val="tx1"/>
+            </a:fontRef>
+          </p:style>
+        </p:cxnSp>
+        <p:cxnSp>
+          <p:nvCxnSpPr>
+            <p:cNvPr id="22" name="Conector recto de flecha 21"/>
+            <p:cNvCxnSpPr/>
+            <p:nvPr/>
+          </p:nvCxnSpPr>
+          <p:spPr>
+            <a:xfrm flipV="1">
+              <a:off x="8601156" y="5078934"/>
+              <a:ext cx="4617" cy="260748"/>
+            </a:xfrm>
+            <a:prstGeom prst="straightConnector1">
+              <a:avLst/>
+            </a:prstGeom>
+            <a:ln w="25400">
+              <a:solidFill>
+                <a:srgbClr val="C00000"/>
+              </a:solidFill>
+              <a:tailEnd type="triangle"/>
+            </a:ln>
+          </p:spPr>
+          <p:style>
+            <a:lnRef idx="1">
+              <a:schemeClr val="accent1"/>
+            </a:lnRef>
+            <a:fillRef idx="0">
+              <a:schemeClr val="accent1"/>
+            </a:fillRef>
+            <a:effectRef idx="0">
+              <a:schemeClr val="accent1"/>
+            </a:effectRef>
+            <a:fontRef idx="minor">
+              <a:schemeClr val="tx1"/>
+            </a:fontRef>
+          </p:style>
+        </p:cxnSp>
+      </p:grpSp>
     </p:spTree>
     <p:extLst>
       <p:ext uri="{BB962C8B-B14F-4D97-AF65-F5344CB8AC3E}">
@@ -5479,121 +5524,136 @@
           </a:prstGeom>
         </p:spPr>
       </p:pic>
-      <p:pic>
-        <p:nvPicPr>
-          <p:cNvPr id="6" name="Imagen 5"/>
-          <p:cNvPicPr>
-            <a:picLocks noChangeAspect="1"/>
-          </p:cNvPicPr>
+      <p:grpSp>
+        <p:nvGrpSpPr>
+          <p:cNvPr id="4" name="Grupo 3"/>
+          <p:cNvGrpSpPr/>
           <p:nvPr/>
-        </p:nvPicPr>
-        <p:blipFill rotWithShape="1">
-          <a:blip r:embed="rId3"/>
-          <a:srcRect t="8667" r="19286" b="12305"/>
-          <a:stretch/>
-        </p:blipFill>
-        <p:spPr>
+        </p:nvGrpSpPr>
+        <p:grpSpPr>
           <a:xfrm>
             <a:off x="6109855" y="1907488"/>
             <a:ext cx="5915890" cy="4798111"/>
-          </a:xfrm>
-          <a:prstGeom prst="rect">
-            <a:avLst/>
-          </a:prstGeom>
-        </p:spPr>
-      </p:pic>
-      <p:sp>
-        <p:nvSpPr>
-          <p:cNvPr id="7" name="Elipse 6"/>
-          <p:cNvSpPr/>
-          <p:nvPr/>
-        </p:nvSpPr>
-        <p:spPr>
-          <a:xfrm>
-            <a:off x="6359236" y="2341418"/>
-            <a:ext cx="3158837" cy="415637"/>
-          </a:xfrm>
-          <a:prstGeom prst="ellipse">
-            <a:avLst/>
-          </a:prstGeom>
-          <a:noFill/>
-          <a:ln>
-            <a:solidFill>
-              <a:srgbClr val="FF0000"/>
-            </a:solidFill>
-          </a:ln>
-        </p:spPr>
-        <p:style>
-          <a:lnRef idx="2">
-            <a:schemeClr val="accent1">
-              <a:shade val="50000"/>
-            </a:schemeClr>
-          </a:lnRef>
-          <a:fillRef idx="1">
-            <a:schemeClr val="accent1"/>
-          </a:fillRef>
-          <a:effectRef idx="0">
-            <a:schemeClr val="accent1"/>
-          </a:effectRef>
-          <a:fontRef idx="minor">
-            <a:schemeClr val="lt1"/>
-          </a:fontRef>
-        </p:style>
-        <p:txBody>
-          <a:bodyPr rtlCol="0" anchor="ctr"/>
-          <a:lstStyle/>
-          <a:p>
-            <a:pPr algn="ctr"/>
-            <a:endParaRPr lang="es-CO" dirty="0"/>
-          </a:p>
-        </p:txBody>
-      </p:sp>
-      <p:sp>
-        <p:nvSpPr>
-          <p:cNvPr id="10" name="Elipse 9"/>
-          <p:cNvSpPr/>
-          <p:nvPr/>
-        </p:nvSpPr>
-        <p:spPr>
-          <a:xfrm>
-            <a:off x="6359235" y="5721927"/>
-            <a:ext cx="5472545" cy="415637"/>
-          </a:xfrm>
-          <a:prstGeom prst="ellipse">
-            <a:avLst/>
-          </a:prstGeom>
-          <a:noFill/>
-          <a:ln>
-            <a:solidFill>
-              <a:srgbClr val="FF0000"/>
-            </a:solidFill>
-          </a:ln>
-        </p:spPr>
-        <p:style>
-          <a:lnRef idx="2">
-            <a:schemeClr val="accent1">
-              <a:shade val="50000"/>
-            </a:schemeClr>
-          </a:lnRef>
-          <a:fillRef idx="1">
-            <a:schemeClr val="accent1"/>
-          </a:fillRef>
-          <a:effectRef idx="0">
-            <a:schemeClr val="accent1"/>
-          </a:effectRef>
-          <a:fontRef idx="minor">
-            <a:schemeClr val="lt1"/>
-          </a:fontRef>
-        </p:style>
-        <p:txBody>
-          <a:bodyPr rtlCol="0" anchor="ctr"/>
-          <a:lstStyle/>
-          <a:p>
-            <a:pPr algn="ctr"/>
-            <a:endParaRPr lang="es-CO" dirty="0"/>
-          </a:p>
-        </p:txBody>
-      </p:sp>
+            <a:chOff x="6109855" y="1907488"/>
+            <a:chExt cx="5915890" cy="4798111"/>
+          </a:xfrm>
+        </p:grpSpPr>
+        <p:pic>
+          <p:nvPicPr>
+            <p:cNvPr id="6" name="Imagen 5"/>
+            <p:cNvPicPr>
+              <a:picLocks noChangeAspect="1"/>
+            </p:cNvPicPr>
+            <p:nvPr/>
+          </p:nvPicPr>
+          <p:blipFill rotWithShape="1">
+            <a:blip r:embed="rId3"/>
+            <a:srcRect t="8667" r="19286" b="12305"/>
+            <a:stretch/>
+          </p:blipFill>
+          <p:spPr>
+            <a:xfrm>
+              <a:off x="6109855" y="1907488"/>
+              <a:ext cx="5915890" cy="4798111"/>
+            </a:xfrm>
+            <a:prstGeom prst="rect">
+              <a:avLst/>
+            </a:prstGeom>
+          </p:spPr>
+        </p:pic>
+        <p:sp>
+          <p:nvSpPr>
+            <p:cNvPr id="7" name="Elipse 6"/>
+            <p:cNvSpPr/>
+            <p:nvPr/>
+          </p:nvSpPr>
+          <p:spPr>
+            <a:xfrm>
+              <a:off x="6359236" y="2341418"/>
+              <a:ext cx="3158837" cy="415637"/>
+            </a:xfrm>
+            <a:prstGeom prst="ellipse">
+              <a:avLst/>
+            </a:prstGeom>
+            <a:noFill/>
+            <a:ln>
+              <a:solidFill>
+                <a:srgbClr val="FF0000"/>
+              </a:solidFill>
+            </a:ln>
+          </p:spPr>
+          <p:style>
+            <a:lnRef idx="2">
+              <a:schemeClr val="accent1">
+                <a:shade val="50000"/>
+              </a:schemeClr>
+            </a:lnRef>
+            <a:fillRef idx="1">
+              <a:schemeClr val="accent1"/>
+            </a:fillRef>
+            <a:effectRef idx="0">
+              <a:schemeClr val="accent1"/>
+            </a:effectRef>
+            <a:fontRef idx="minor">
+              <a:schemeClr val="lt1"/>
+            </a:fontRef>
+          </p:style>
+          <p:txBody>
+            <a:bodyPr rtlCol="0" anchor="ctr"/>
+            <a:lstStyle/>
+            <a:p>
+              <a:pPr algn="ctr"/>
+              <a:endParaRPr lang="es-CO" dirty="0"/>
+            </a:p>
+          </p:txBody>
+        </p:sp>
+        <p:sp>
+          <p:nvSpPr>
+            <p:cNvPr id="10" name="Elipse 9"/>
+            <p:cNvSpPr/>
+            <p:nvPr/>
+          </p:nvSpPr>
+          <p:spPr>
+            <a:xfrm>
+              <a:off x="6359235" y="5721927"/>
+              <a:ext cx="5472545" cy="415637"/>
+            </a:xfrm>
+            <a:prstGeom prst="ellipse">
+              <a:avLst/>
+            </a:prstGeom>
+            <a:noFill/>
+            <a:ln>
+              <a:solidFill>
+                <a:srgbClr val="FF0000"/>
+              </a:solidFill>
+            </a:ln>
+          </p:spPr>
+          <p:style>
+            <a:lnRef idx="2">
+              <a:schemeClr val="accent1">
+                <a:shade val="50000"/>
+              </a:schemeClr>
+            </a:lnRef>
+            <a:fillRef idx="1">
+              <a:schemeClr val="accent1"/>
+            </a:fillRef>
+            <a:effectRef idx="0">
+              <a:schemeClr val="accent1"/>
+            </a:effectRef>
+            <a:fontRef idx="minor">
+              <a:schemeClr val="lt1"/>
+            </a:fontRef>
+          </p:style>
+          <p:txBody>
+            <a:bodyPr rtlCol="0" anchor="ctr"/>
+            <a:lstStyle/>
+            <a:p>
+              <a:pPr algn="ctr"/>
+              <a:endParaRPr lang="es-CO" dirty="0"/>
+            </a:p>
+          </p:txBody>
+        </p:sp>
+      </p:grpSp>
     </p:spTree>
     <p:extLst>
       <p:ext uri="{BB962C8B-B14F-4D97-AF65-F5344CB8AC3E}">
@@ -5681,174 +5741,189 @@
           </a:prstGeom>
         </p:spPr>
       </p:pic>
-      <p:pic>
-        <p:nvPicPr>
-          <p:cNvPr id="4" name="Imagen 3"/>
-          <p:cNvPicPr>
-            <a:picLocks noChangeAspect="1"/>
-          </p:cNvPicPr>
+      <p:grpSp>
+        <p:nvGrpSpPr>
+          <p:cNvPr id="5" name="Grupo 4"/>
+          <p:cNvGrpSpPr/>
           <p:nvPr/>
-        </p:nvPicPr>
-        <p:blipFill>
-          <a:blip r:embed="rId3"/>
-          <a:stretch>
-            <a:fillRect/>
-          </a:stretch>
-        </p:blipFill>
-        <p:spPr>
+        </p:nvGrpSpPr>
+        <p:grpSpPr>
           <a:xfrm>
             <a:off x="5818256" y="2310694"/>
             <a:ext cx="6199573" cy="4191706"/>
-          </a:xfrm>
-          <a:prstGeom prst="rect">
-            <a:avLst/>
-          </a:prstGeom>
-        </p:spPr>
-      </p:pic>
-      <p:cxnSp>
-        <p:nvCxnSpPr>
-          <p:cNvPr id="7" name="Conector recto de flecha 6"/>
-          <p:cNvCxnSpPr/>
-          <p:nvPr/>
-        </p:nvCxnSpPr>
-        <p:spPr>
-          <a:xfrm>
-            <a:off x="5981865" y="3422827"/>
-            <a:ext cx="3298" cy="503903"/>
-          </a:xfrm>
-          <a:prstGeom prst="straightConnector1">
-            <a:avLst/>
-          </a:prstGeom>
-          <a:ln w="25400">
-            <a:solidFill>
-              <a:srgbClr val="C00000"/>
-            </a:solidFill>
-            <a:tailEnd type="triangle"/>
-          </a:ln>
-        </p:spPr>
-        <p:style>
-          <a:lnRef idx="1">
-            <a:schemeClr val="accent1"/>
-          </a:lnRef>
-          <a:fillRef idx="0">
-            <a:schemeClr val="accent1"/>
-          </a:fillRef>
-          <a:effectRef idx="0">
-            <a:schemeClr val="accent1"/>
-          </a:effectRef>
-          <a:fontRef idx="minor">
-            <a:schemeClr val="tx1"/>
-          </a:fontRef>
-        </p:style>
-      </p:cxnSp>
-      <p:cxnSp>
-        <p:nvCxnSpPr>
-          <p:cNvPr id="19" name="Conector recto de flecha 18"/>
-          <p:cNvCxnSpPr/>
-          <p:nvPr/>
-        </p:nvCxnSpPr>
-        <p:spPr>
-          <a:xfrm>
-            <a:off x="8184737" y="5320900"/>
-            <a:ext cx="3298" cy="503903"/>
-          </a:xfrm>
-          <a:prstGeom prst="straightConnector1">
-            <a:avLst/>
-          </a:prstGeom>
-          <a:ln w="25400">
-            <a:solidFill>
-              <a:srgbClr val="C00000"/>
-            </a:solidFill>
-            <a:tailEnd type="triangle"/>
-          </a:ln>
-        </p:spPr>
-        <p:style>
-          <a:lnRef idx="1">
-            <a:schemeClr val="accent1"/>
-          </a:lnRef>
-          <a:fillRef idx="0">
-            <a:schemeClr val="accent1"/>
-          </a:fillRef>
-          <a:effectRef idx="0">
-            <a:schemeClr val="accent1"/>
-          </a:effectRef>
-          <a:fontRef idx="minor">
-            <a:schemeClr val="tx1"/>
-          </a:fontRef>
-        </p:style>
-      </p:cxnSp>
-      <p:cxnSp>
-        <p:nvCxnSpPr>
-          <p:cNvPr id="23" name="Conector recto de flecha 22"/>
-          <p:cNvCxnSpPr/>
-          <p:nvPr/>
-        </p:nvCxnSpPr>
-        <p:spPr>
-          <a:xfrm flipH="1" flipV="1">
-            <a:off x="7451099" y="4675632"/>
-            <a:ext cx="2646" cy="381277"/>
-          </a:xfrm>
-          <a:prstGeom prst="straightConnector1">
-            <a:avLst/>
-          </a:prstGeom>
-          <a:ln w="25400">
-            <a:solidFill>
-              <a:srgbClr val="C00000"/>
-            </a:solidFill>
-            <a:tailEnd type="triangle"/>
-          </a:ln>
-        </p:spPr>
-        <p:style>
-          <a:lnRef idx="1">
-            <a:schemeClr val="accent1"/>
-          </a:lnRef>
-          <a:fillRef idx="0">
-            <a:schemeClr val="accent1"/>
-          </a:fillRef>
-          <a:effectRef idx="0">
-            <a:schemeClr val="accent1"/>
-          </a:effectRef>
-          <a:fontRef idx="minor">
-            <a:schemeClr val="tx1"/>
-          </a:fontRef>
-        </p:style>
-      </p:cxnSp>
-      <p:cxnSp>
-        <p:nvCxnSpPr>
-          <p:cNvPr id="26" name="Conector recto de flecha 25"/>
-          <p:cNvCxnSpPr/>
-          <p:nvPr/>
-        </p:nvCxnSpPr>
-        <p:spPr>
-          <a:xfrm>
-            <a:off x="10443680" y="5824803"/>
-            <a:ext cx="3298" cy="251951"/>
-          </a:xfrm>
-          <a:prstGeom prst="straightConnector1">
-            <a:avLst/>
-          </a:prstGeom>
-          <a:ln w="25400">
-            <a:solidFill>
-              <a:srgbClr val="C00000"/>
-            </a:solidFill>
-            <a:tailEnd type="triangle"/>
-          </a:ln>
-        </p:spPr>
-        <p:style>
-          <a:lnRef idx="1">
-            <a:schemeClr val="accent1"/>
-          </a:lnRef>
-          <a:fillRef idx="0">
-            <a:schemeClr val="accent1"/>
-          </a:fillRef>
-          <a:effectRef idx="0">
-            <a:schemeClr val="accent1"/>
-          </a:effectRef>
-          <a:fontRef idx="minor">
-            <a:schemeClr val="tx1"/>
-          </a:fontRef>
-        </p:style>
-      </p:cxnSp>
+            <a:chOff x="5818256" y="2310694"/>
+            <a:chExt cx="6199573" cy="4191706"/>
+          </a:xfrm>
+        </p:grpSpPr>
+        <p:pic>
+          <p:nvPicPr>
+            <p:cNvPr id="4" name="Imagen 3"/>
+            <p:cNvPicPr>
+              <a:picLocks noChangeAspect="1"/>
+            </p:cNvPicPr>
+            <p:nvPr/>
+          </p:nvPicPr>
+          <p:blipFill>
+            <a:blip r:embed="rId3"/>
+            <a:stretch>
+              <a:fillRect/>
+            </a:stretch>
+          </p:blipFill>
+          <p:spPr>
+            <a:xfrm>
+              <a:off x="5818256" y="2310694"/>
+              <a:ext cx="6199573" cy="4191706"/>
+            </a:xfrm>
+            <a:prstGeom prst="rect">
+              <a:avLst/>
+            </a:prstGeom>
+          </p:spPr>
+        </p:pic>
+        <p:cxnSp>
+          <p:nvCxnSpPr>
+            <p:cNvPr id="7" name="Conector recto de flecha 6"/>
+            <p:cNvCxnSpPr/>
+            <p:nvPr/>
+          </p:nvCxnSpPr>
+          <p:spPr>
+            <a:xfrm>
+              <a:off x="5981865" y="3422827"/>
+              <a:ext cx="3298" cy="503903"/>
+            </a:xfrm>
+            <a:prstGeom prst="straightConnector1">
+              <a:avLst/>
+            </a:prstGeom>
+            <a:ln w="25400">
+              <a:solidFill>
+                <a:srgbClr val="C00000"/>
+              </a:solidFill>
+              <a:tailEnd type="triangle"/>
+            </a:ln>
+          </p:spPr>
+          <p:style>
+            <a:lnRef idx="1">
+              <a:schemeClr val="accent1"/>
+            </a:lnRef>
+            <a:fillRef idx="0">
+              <a:schemeClr val="accent1"/>
+            </a:fillRef>
+            <a:effectRef idx="0">
+              <a:schemeClr val="accent1"/>
+            </a:effectRef>
+            <a:fontRef idx="minor">
+              <a:schemeClr val="tx1"/>
+            </a:fontRef>
+          </p:style>
+        </p:cxnSp>
+        <p:cxnSp>
+          <p:nvCxnSpPr>
+            <p:cNvPr id="19" name="Conector recto de flecha 18"/>
+            <p:cNvCxnSpPr/>
+            <p:nvPr/>
+          </p:nvCxnSpPr>
+          <p:spPr>
+            <a:xfrm>
+              <a:off x="8184737" y="5320900"/>
+              <a:ext cx="3298" cy="503903"/>
+            </a:xfrm>
+            <a:prstGeom prst="straightConnector1">
+              <a:avLst/>
+            </a:prstGeom>
+            <a:ln w="25400">
+              <a:solidFill>
+                <a:srgbClr val="C00000"/>
+              </a:solidFill>
+              <a:tailEnd type="triangle"/>
+            </a:ln>
+          </p:spPr>
+          <p:style>
+            <a:lnRef idx="1">
+              <a:schemeClr val="accent1"/>
+            </a:lnRef>
+            <a:fillRef idx="0">
+              <a:schemeClr val="accent1"/>
+            </a:fillRef>
+            <a:effectRef idx="0">
+              <a:schemeClr val="accent1"/>
+            </a:effectRef>
+            <a:fontRef idx="minor">
+              <a:schemeClr val="tx1"/>
+            </a:fontRef>
+          </p:style>
+        </p:cxnSp>
+        <p:cxnSp>
+          <p:nvCxnSpPr>
+            <p:cNvPr id="23" name="Conector recto de flecha 22"/>
+            <p:cNvCxnSpPr/>
+            <p:nvPr/>
+          </p:nvCxnSpPr>
+          <p:spPr>
+            <a:xfrm flipH="1" flipV="1">
+              <a:off x="7451099" y="4675632"/>
+              <a:ext cx="2646" cy="381277"/>
+            </a:xfrm>
+            <a:prstGeom prst="straightConnector1">
+              <a:avLst/>
+            </a:prstGeom>
+            <a:ln w="25400">
+              <a:solidFill>
+                <a:srgbClr val="C00000"/>
+              </a:solidFill>
+              <a:tailEnd type="triangle"/>
+            </a:ln>
+          </p:spPr>
+          <p:style>
+            <a:lnRef idx="1">
+              <a:schemeClr val="accent1"/>
+            </a:lnRef>
+            <a:fillRef idx="0">
+              <a:schemeClr val="accent1"/>
+            </a:fillRef>
+            <a:effectRef idx="0">
+              <a:schemeClr val="accent1"/>
+            </a:effectRef>
+            <a:fontRef idx="minor">
+              <a:schemeClr val="tx1"/>
+            </a:fontRef>
+          </p:style>
+        </p:cxnSp>
+        <p:cxnSp>
+          <p:nvCxnSpPr>
+            <p:cNvPr id="26" name="Conector recto de flecha 25"/>
+            <p:cNvCxnSpPr/>
+            <p:nvPr/>
+          </p:nvCxnSpPr>
+          <p:spPr>
+            <a:xfrm>
+              <a:off x="10443680" y="5824803"/>
+              <a:ext cx="3298" cy="251951"/>
+            </a:xfrm>
+            <a:prstGeom prst="straightConnector1">
+              <a:avLst/>
+            </a:prstGeom>
+            <a:ln w="25400">
+              <a:solidFill>
+                <a:srgbClr val="C00000"/>
+              </a:solidFill>
+              <a:tailEnd type="triangle"/>
+            </a:ln>
+          </p:spPr>
+          <p:style>
+            <a:lnRef idx="1">
+              <a:schemeClr val="accent1"/>
+            </a:lnRef>
+            <a:fillRef idx="0">
+              <a:schemeClr val="accent1"/>
+            </a:fillRef>
+            <a:effectRef idx="0">
+              <a:schemeClr val="accent1"/>
+            </a:effectRef>
+            <a:fontRef idx="minor">
+              <a:schemeClr val="tx1"/>
+            </a:fontRef>
+          </p:style>
+        </p:cxnSp>
+      </p:grpSp>
       <p:sp>
         <p:nvSpPr>
           <p:cNvPr id="27" name="CuadroTexto 26"/>
@@ -6610,7 +6685,7 @@
       </p:sp>
       <p:pic>
         <p:nvPicPr>
-          <p:cNvPr id="5" name="Imagen 4"/>
+          <p:cNvPr id="6" name="Imagen 5"/>
           <p:cNvPicPr>
             <a:picLocks noChangeAspect="1"/>
           </p:cNvPicPr>
@@ -6624,74 +6699,89 @@
         </p:blipFill>
         <p:spPr>
           <a:xfrm>
-            <a:off x="0" y="1721975"/>
-            <a:ext cx="6008914" cy="4983625"/>
+            <a:off x="6008914" y="1721975"/>
+            <a:ext cx="6023429" cy="4983625"/>
           </a:xfrm>
           <a:prstGeom prst="rect">
             <a:avLst/>
           </a:prstGeom>
         </p:spPr>
       </p:pic>
-      <p:pic>
-        <p:nvPicPr>
-          <p:cNvPr id="6" name="Imagen 5"/>
-          <p:cNvPicPr>
-            <a:picLocks noChangeAspect="1"/>
-          </p:cNvPicPr>
+      <p:grpSp>
+        <p:nvGrpSpPr>
+          <p:cNvPr id="3" name="Grupo 2"/>
+          <p:cNvGrpSpPr/>
           <p:nvPr/>
-        </p:nvPicPr>
-        <p:blipFill>
-          <a:blip r:embed="rId3"/>
-          <a:stretch>
-            <a:fillRect/>
-          </a:stretch>
-        </p:blipFill>
-        <p:spPr>
-          <a:xfrm>
-            <a:off x="6008914" y="1721975"/>
-            <a:ext cx="6023429" cy="4983625"/>
-          </a:xfrm>
-          <a:prstGeom prst="rect">
-            <a:avLst/>
-          </a:prstGeom>
-        </p:spPr>
-      </p:pic>
-      <p:sp>
-        <p:nvSpPr>
-          <p:cNvPr id="7" name="CuadroTexto 6"/>
-          <p:cNvSpPr txBox="1"/>
-          <p:nvPr/>
-        </p:nvSpPr>
-        <p:spPr>
-          <a:xfrm>
-            <a:off x="2358572" y="1426130"/>
-            <a:ext cx="2496457" cy="369332"/>
-          </a:xfrm>
-          <a:prstGeom prst="rect">
-            <a:avLst/>
-          </a:prstGeom>
-          <a:noFill/>
-        </p:spPr>
-        <p:txBody>
-          <a:bodyPr wrap="square" rtlCol="0">
-            <a:spAutoFit/>
-          </a:bodyPr>
-          <a:lstStyle/>
-          <a:p>
-            <a:pPr algn="ctr"/>
-            <a:r>
-              <a:rPr lang="es-CO" b="1" i="1" dirty="0">
-                <a:solidFill>
-                  <a:schemeClr val="accent3">
-                    <a:lumMod val="50000"/>
-                  </a:schemeClr>
-                </a:solidFill>
-              </a:rPr>
-              <a:t>ACUERDO AGOSTO</a:t>
-            </a:r>
-          </a:p>
-        </p:txBody>
-      </p:sp>
+        </p:nvGrpSpPr>
+        <p:grpSpPr>
+          <a:xfrm>
+            <a:off x="0" y="1426130"/>
+            <a:ext cx="6008914" cy="5279470"/>
+            <a:chOff x="0" y="1426130"/>
+            <a:chExt cx="6008914" cy="5279470"/>
+          </a:xfrm>
+        </p:grpSpPr>
+        <p:pic>
+          <p:nvPicPr>
+            <p:cNvPr id="5" name="Imagen 4"/>
+            <p:cNvPicPr>
+              <a:picLocks noChangeAspect="1"/>
+            </p:cNvPicPr>
+            <p:nvPr/>
+          </p:nvPicPr>
+          <p:blipFill>
+            <a:blip r:embed="rId3"/>
+            <a:stretch>
+              <a:fillRect/>
+            </a:stretch>
+          </p:blipFill>
+          <p:spPr>
+            <a:xfrm>
+              <a:off x="0" y="1721975"/>
+              <a:ext cx="6008914" cy="4983625"/>
+            </a:xfrm>
+            <a:prstGeom prst="rect">
+              <a:avLst/>
+            </a:prstGeom>
+          </p:spPr>
+        </p:pic>
+        <p:sp>
+          <p:nvSpPr>
+            <p:cNvPr id="7" name="CuadroTexto 6"/>
+            <p:cNvSpPr txBox="1"/>
+            <p:nvPr/>
+          </p:nvSpPr>
+          <p:spPr>
+            <a:xfrm>
+              <a:off x="2358572" y="1426130"/>
+              <a:ext cx="2496457" cy="369332"/>
+            </a:xfrm>
+            <a:prstGeom prst="rect">
+              <a:avLst/>
+            </a:prstGeom>
+            <a:noFill/>
+          </p:spPr>
+          <p:txBody>
+            <a:bodyPr wrap="square" rtlCol="0">
+              <a:spAutoFit/>
+            </a:bodyPr>
+            <a:lstStyle/>
+            <a:p>
+              <a:pPr algn="ctr"/>
+              <a:r>
+                <a:rPr lang="es-CO" b="1" i="1" dirty="0">
+                  <a:solidFill>
+                    <a:schemeClr val="accent3">
+                      <a:lumMod val="50000"/>
+                    </a:schemeClr>
+                  </a:solidFill>
+                </a:rPr>
+                <a:t>ACUERDO AGOSTO</a:t>
+              </a:r>
+            </a:p>
+          </p:txBody>
+        </p:sp>
+      </p:grpSp>
       <p:sp>
         <p:nvSpPr>
           <p:cNvPr id="8" name="CuadroTexto 7"/>
@@ -7020,246 +7110,261 @@
           </a:prstGeom>
         </p:spPr>
       </p:pic>
-      <p:pic>
-        <p:nvPicPr>
-          <p:cNvPr id="4" name="Imagen 3"/>
-          <p:cNvPicPr>
-            <a:picLocks noChangeAspect="1"/>
-          </p:cNvPicPr>
+      <p:grpSp>
+        <p:nvGrpSpPr>
+          <p:cNvPr id="5" name="Grupo 4"/>
+          <p:cNvGrpSpPr/>
           <p:nvPr/>
-        </p:nvPicPr>
-        <p:blipFill>
-          <a:blip r:embed="rId3"/>
-          <a:stretch>
-            <a:fillRect/>
-          </a:stretch>
-        </p:blipFill>
-        <p:spPr>
+        </p:nvGrpSpPr>
+        <p:grpSpPr>
           <a:xfrm>
             <a:off x="5825744" y="2259942"/>
             <a:ext cx="6195187" cy="4132941"/>
-          </a:xfrm>
-          <a:prstGeom prst="rect">
-            <a:avLst/>
-          </a:prstGeom>
-        </p:spPr>
-      </p:pic>
-      <p:cxnSp>
-        <p:nvCxnSpPr>
-          <p:cNvPr id="7" name="Conector recto de flecha 6"/>
-          <p:cNvCxnSpPr/>
-          <p:nvPr/>
-        </p:nvCxnSpPr>
-        <p:spPr>
-          <a:xfrm flipV="1">
-            <a:off x="6181765" y="3408218"/>
-            <a:ext cx="0" cy="595746"/>
-          </a:xfrm>
-          <a:prstGeom prst="straightConnector1">
-            <a:avLst/>
-          </a:prstGeom>
-          <a:ln w="25400">
-            <a:solidFill>
-              <a:srgbClr val="C00000"/>
-            </a:solidFill>
-            <a:tailEnd type="triangle"/>
-          </a:ln>
-        </p:spPr>
-        <p:style>
-          <a:lnRef idx="1">
-            <a:schemeClr val="accent1"/>
-          </a:lnRef>
-          <a:fillRef idx="0">
-            <a:schemeClr val="accent1"/>
-          </a:fillRef>
-          <a:effectRef idx="0">
-            <a:schemeClr val="accent1"/>
-          </a:effectRef>
-          <a:fontRef idx="minor">
-            <a:schemeClr val="tx1"/>
-          </a:fontRef>
-        </p:style>
-      </p:cxnSp>
-      <p:cxnSp>
-        <p:nvCxnSpPr>
-          <p:cNvPr id="12" name="Conector recto de flecha 11"/>
-          <p:cNvCxnSpPr/>
-          <p:nvPr/>
-        </p:nvCxnSpPr>
-        <p:spPr>
-          <a:xfrm flipV="1">
-            <a:off x="6769595" y="3631211"/>
-            <a:ext cx="0" cy="595746"/>
-          </a:xfrm>
-          <a:prstGeom prst="straightConnector1">
-            <a:avLst/>
-          </a:prstGeom>
-          <a:ln w="25400">
-            <a:solidFill>
-              <a:srgbClr val="C00000"/>
-            </a:solidFill>
-            <a:tailEnd type="triangle"/>
-          </a:ln>
-        </p:spPr>
-        <p:style>
-          <a:lnRef idx="1">
-            <a:schemeClr val="accent1"/>
-          </a:lnRef>
-          <a:fillRef idx="0">
-            <a:schemeClr val="accent1"/>
-          </a:fillRef>
-          <a:effectRef idx="0">
-            <a:schemeClr val="accent1"/>
-          </a:effectRef>
-          <a:fontRef idx="minor">
-            <a:schemeClr val="tx1"/>
-          </a:fontRef>
-        </p:style>
-      </p:cxnSp>
-      <p:cxnSp>
-        <p:nvCxnSpPr>
-          <p:cNvPr id="13" name="Conector recto de flecha 12"/>
-          <p:cNvCxnSpPr/>
-          <p:nvPr/>
-        </p:nvCxnSpPr>
-        <p:spPr>
-          <a:xfrm flipV="1">
-            <a:off x="7350166" y="3730666"/>
-            <a:ext cx="0" cy="595746"/>
-          </a:xfrm>
-          <a:prstGeom prst="straightConnector1">
-            <a:avLst/>
-          </a:prstGeom>
-          <a:ln w="25400">
-            <a:solidFill>
-              <a:srgbClr val="C00000"/>
-            </a:solidFill>
-            <a:tailEnd type="triangle"/>
-          </a:ln>
-        </p:spPr>
-        <p:style>
-          <a:lnRef idx="1">
-            <a:schemeClr val="accent1"/>
-          </a:lnRef>
-          <a:fillRef idx="0">
-            <a:schemeClr val="accent1"/>
-          </a:fillRef>
-          <a:effectRef idx="0">
-            <a:schemeClr val="accent1"/>
-          </a:effectRef>
-          <a:fontRef idx="minor">
-            <a:schemeClr val="tx1"/>
-          </a:fontRef>
-        </p:style>
-      </p:cxnSp>
-      <p:cxnSp>
-        <p:nvCxnSpPr>
-          <p:cNvPr id="14" name="Conector recto de flecha 13"/>
-          <p:cNvCxnSpPr/>
-          <p:nvPr/>
-        </p:nvCxnSpPr>
-        <p:spPr>
-          <a:xfrm flipV="1">
-            <a:off x="7916223" y="3730666"/>
-            <a:ext cx="0" cy="595746"/>
-          </a:xfrm>
-          <a:prstGeom prst="straightConnector1">
-            <a:avLst/>
-          </a:prstGeom>
-          <a:ln w="25400">
-            <a:solidFill>
-              <a:srgbClr val="C00000"/>
-            </a:solidFill>
-            <a:tailEnd type="triangle"/>
-          </a:ln>
-        </p:spPr>
-        <p:style>
-          <a:lnRef idx="1">
-            <a:schemeClr val="accent1"/>
-          </a:lnRef>
-          <a:fillRef idx="0">
-            <a:schemeClr val="accent1"/>
-          </a:fillRef>
-          <a:effectRef idx="0">
-            <a:schemeClr val="accent1"/>
-          </a:effectRef>
-          <a:fontRef idx="minor">
-            <a:schemeClr val="tx1"/>
-          </a:fontRef>
-        </p:style>
-      </p:cxnSp>
-      <p:cxnSp>
-        <p:nvCxnSpPr>
-          <p:cNvPr id="15" name="Conector recto de flecha 14"/>
-          <p:cNvCxnSpPr/>
-          <p:nvPr/>
-        </p:nvCxnSpPr>
-        <p:spPr>
-          <a:xfrm flipV="1">
-            <a:off x="8467766" y="4003964"/>
-            <a:ext cx="0" cy="595746"/>
-          </a:xfrm>
-          <a:prstGeom prst="straightConnector1">
-            <a:avLst/>
-          </a:prstGeom>
-          <a:ln w="25400">
-            <a:solidFill>
-              <a:srgbClr val="C00000"/>
-            </a:solidFill>
-            <a:tailEnd type="triangle"/>
-          </a:ln>
-        </p:spPr>
-        <p:style>
-          <a:lnRef idx="1">
-            <a:schemeClr val="accent1"/>
-          </a:lnRef>
-          <a:fillRef idx="0">
-            <a:schemeClr val="accent1"/>
-          </a:fillRef>
-          <a:effectRef idx="0">
-            <a:schemeClr val="accent1"/>
-          </a:effectRef>
-          <a:fontRef idx="minor">
-            <a:schemeClr val="tx1"/>
-          </a:fontRef>
-        </p:style>
-      </p:cxnSp>
-      <p:cxnSp>
-        <p:nvCxnSpPr>
-          <p:cNvPr id="16" name="Conector recto de flecha 15"/>
-          <p:cNvCxnSpPr/>
-          <p:nvPr/>
-        </p:nvCxnSpPr>
-        <p:spPr>
-          <a:xfrm flipV="1">
-            <a:off x="9033824" y="4028539"/>
-            <a:ext cx="0" cy="595746"/>
-          </a:xfrm>
-          <a:prstGeom prst="straightConnector1">
-            <a:avLst/>
-          </a:prstGeom>
-          <a:ln w="25400">
-            <a:solidFill>
-              <a:srgbClr val="C00000"/>
-            </a:solidFill>
-            <a:tailEnd type="triangle"/>
-          </a:ln>
-        </p:spPr>
-        <p:style>
-          <a:lnRef idx="1">
-            <a:schemeClr val="accent1"/>
-          </a:lnRef>
-          <a:fillRef idx="0">
-            <a:schemeClr val="accent1"/>
-          </a:fillRef>
-          <a:effectRef idx="0">
-            <a:schemeClr val="accent1"/>
-          </a:effectRef>
-          <a:fontRef idx="minor">
-            <a:schemeClr val="tx1"/>
-          </a:fontRef>
-        </p:style>
-      </p:cxnSp>
+            <a:chOff x="5825744" y="2259942"/>
+            <a:chExt cx="6195187" cy="4132941"/>
+          </a:xfrm>
+        </p:grpSpPr>
+        <p:pic>
+          <p:nvPicPr>
+            <p:cNvPr id="4" name="Imagen 3"/>
+            <p:cNvPicPr>
+              <a:picLocks noChangeAspect="1"/>
+            </p:cNvPicPr>
+            <p:nvPr/>
+          </p:nvPicPr>
+          <p:blipFill>
+            <a:blip r:embed="rId3"/>
+            <a:stretch>
+              <a:fillRect/>
+            </a:stretch>
+          </p:blipFill>
+          <p:spPr>
+            <a:xfrm>
+              <a:off x="5825744" y="2259942"/>
+              <a:ext cx="6195187" cy="4132941"/>
+            </a:xfrm>
+            <a:prstGeom prst="rect">
+              <a:avLst/>
+            </a:prstGeom>
+          </p:spPr>
+        </p:pic>
+        <p:cxnSp>
+          <p:nvCxnSpPr>
+            <p:cNvPr id="7" name="Conector recto de flecha 6"/>
+            <p:cNvCxnSpPr/>
+            <p:nvPr/>
+          </p:nvCxnSpPr>
+          <p:spPr>
+            <a:xfrm flipV="1">
+              <a:off x="6181765" y="3408218"/>
+              <a:ext cx="0" cy="595746"/>
+            </a:xfrm>
+            <a:prstGeom prst="straightConnector1">
+              <a:avLst/>
+            </a:prstGeom>
+            <a:ln w="25400">
+              <a:solidFill>
+                <a:srgbClr val="C00000"/>
+              </a:solidFill>
+              <a:tailEnd type="triangle"/>
+            </a:ln>
+          </p:spPr>
+          <p:style>
+            <a:lnRef idx="1">
+              <a:schemeClr val="accent1"/>
+            </a:lnRef>
+            <a:fillRef idx="0">
+              <a:schemeClr val="accent1"/>
+            </a:fillRef>
+            <a:effectRef idx="0">
+              <a:schemeClr val="accent1"/>
+            </a:effectRef>
+            <a:fontRef idx="minor">
+              <a:schemeClr val="tx1"/>
+            </a:fontRef>
+          </p:style>
+        </p:cxnSp>
+        <p:cxnSp>
+          <p:nvCxnSpPr>
+            <p:cNvPr id="12" name="Conector recto de flecha 11"/>
+            <p:cNvCxnSpPr/>
+            <p:nvPr/>
+          </p:nvCxnSpPr>
+          <p:spPr>
+            <a:xfrm flipV="1">
+              <a:off x="6769595" y="3631211"/>
+              <a:ext cx="0" cy="595746"/>
+            </a:xfrm>
+            <a:prstGeom prst="straightConnector1">
+              <a:avLst/>
+            </a:prstGeom>
+            <a:ln w="25400">
+              <a:solidFill>
+                <a:srgbClr val="C00000"/>
+              </a:solidFill>
+              <a:tailEnd type="triangle"/>
+            </a:ln>
+          </p:spPr>
+          <p:style>
+            <a:lnRef idx="1">
+              <a:schemeClr val="accent1"/>
+            </a:lnRef>
+            <a:fillRef idx="0">
+              <a:schemeClr val="accent1"/>
+            </a:fillRef>
+            <a:effectRef idx="0">
+              <a:schemeClr val="accent1"/>
+            </a:effectRef>
+            <a:fontRef idx="minor">
+              <a:schemeClr val="tx1"/>
+            </a:fontRef>
+          </p:style>
+        </p:cxnSp>
+        <p:cxnSp>
+          <p:nvCxnSpPr>
+            <p:cNvPr id="13" name="Conector recto de flecha 12"/>
+            <p:cNvCxnSpPr/>
+            <p:nvPr/>
+          </p:nvCxnSpPr>
+          <p:spPr>
+            <a:xfrm flipV="1">
+              <a:off x="7350166" y="3730666"/>
+              <a:ext cx="0" cy="595746"/>
+            </a:xfrm>
+            <a:prstGeom prst="straightConnector1">
+              <a:avLst/>
+            </a:prstGeom>
+            <a:ln w="25400">
+              <a:solidFill>
+                <a:srgbClr val="C00000"/>
+              </a:solidFill>
+              <a:tailEnd type="triangle"/>
+            </a:ln>
+          </p:spPr>
+          <p:style>
+            <a:lnRef idx="1">
+              <a:schemeClr val="accent1"/>
+            </a:lnRef>
+            <a:fillRef idx="0">
+              <a:schemeClr val="accent1"/>
+            </a:fillRef>
+            <a:effectRef idx="0">
+              <a:schemeClr val="accent1"/>
+            </a:effectRef>
+            <a:fontRef idx="minor">
+              <a:schemeClr val="tx1"/>
+            </a:fontRef>
+          </p:style>
+        </p:cxnSp>
+        <p:cxnSp>
+          <p:nvCxnSpPr>
+            <p:cNvPr id="14" name="Conector recto de flecha 13"/>
+            <p:cNvCxnSpPr/>
+            <p:nvPr/>
+          </p:nvCxnSpPr>
+          <p:spPr>
+            <a:xfrm flipV="1">
+              <a:off x="7916223" y="3730666"/>
+              <a:ext cx="0" cy="595746"/>
+            </a:xfrm>
+            <a:prstGeom prst="straightConnector1">
+              <a:avLst/>
+            </a:prstGeom>
+            <a:ln w="25400">
+              <a:solidFill>
+                <a:srgbClr val="C00000"/>
+              </a:solidFill>
+              <a:tailEnd type="triangle"/>
+            </a:ln>
+          </p:spPr>
+          <p:style>
+            <a:lnRef idx="1">
+              <a:schemeClr val="accent1"/>
+            </a:lnRef>
+            <a:fillRef idx="0">
+              <a:schemeClr val="accent1"/>
+            </a:fillRef>
+            <a:effectRef idx="0">
+              <a:schemeClr val="accent1"/>
+            </a:effectRef>
+            <a:fontRef idx="minor">
+              <a:schemeClr val="tx1"/>
+            </a:fontRef>
+          </p:style>
+        </p:cxnSp>
+        <p:cxnSp>
+          <p:nvCxnSpPr>
+            <p:cNvPr id="15" name="Conector recto de flecha 14"/>
+            <p:cNvCxnSpPr/>
+            <p:nvPr/>
+          </p:nvCxnSpPr>
+          <p:spPr>
+            <a:xfrm flipV="1">
+              <a:off x="8467766" y="4003964"/>
+              <a:ext cx="0" cy="595746"/>
+            </a:xfrm>
+            <a:prstGeom prst="straightConnector1">
+              <a:avLst/>
+            </a:prstGeom>
+            <a:ln w="25400">
+              <a:solidFill>
+                <a:srgbClr val="C00000"/>
+              </a:solidFill>
+              <a:tailEnd type="triangle"/>
+            </a:ln>
+          </p:spPr>
+          <p:style>
+            <a:lnRef idx="1">
+              <a:schemeClr val="accent1"/>
+            </a:lnRef>
+            <a:fillRef idx="0">
+              <a:schemeClr val="accent1"/>
+            </a:fillRef>
+            <a:effectRef idx="0">
+              <a:schemeClr val="accent1"/>
+            </a:effectRef>
+            <a:fontRef idx="minor">
+              <a:schemeClr val="tx1"/>
+            </a:fontRef>
+          </p:style>
+        </p:cxnSp>
+        <p:cxnSp>
+          <p:nvCxnSpPr>
+            <p:cNvPr id="16" name="Conector recto de flecha 15"/>
+            <p:cNvCxnSpPr/>
+            <p:nvPr/>
+          </p:nvCxnSpPr>
+          <p:spPr>
+            <a:xfrm flipV="1">
+              <a:off x="9033824" y="4028539"/>
+              <a:ext cx="0" cy="595746"/>
+            </a:xfrm>
+            <a:prstGeom prst="straightConnector1">
+              <a:avLst/>
+            </a:prstGeom>
+            <a:ln w="25400">
+              <a:solidFill>
+                <a:srgbClr val="C00000"/>
+              </a:solidFill>
+              <a:tailEnd type="triangle"/>
+            </a:ln>
+          </p:spPr>
+          <p:style>
+            <a:lnRef idx="1">
+              <a:schemeClr val="accent1"/>
+            </a:lnRef>
+            <a:fillRef idx="0">
+              <a:schemeClr val="accent1"/>
+            </a:fillRef>
+            <a:effectRef idx="0">
+              <a:schemeClr val="accent1"/>
+            </a:effectRef>
+            <a:fontRef idx="minor">
+              <a:schemeClr val="tx1"/>
+            </a:fontRef>
+          </p:style>
+        </p:cxnSp>
+      </p:grpSp>
     </p:spTree>
     <p:extLst>
       <p:ext uri="{BB962C8B-B14F-4D97-AF65-F5344CB8AC3E}">

</xml_diff>